<commit_message>
Add reason for data harmonisation.
</commit_message>
<xml_diff>
--- a/images/image_maker.pptx
+++ b/images/image_maker.pptx
@@ -5,13 +5,16 @@
     <p:sldMasterId id="2147483648" r:id="rId1"/>
   </p:sldMasterIdLst>
   <p:sldIdLst>
-    <p:sldId id="258" r:id="rId2"/>
-    <p:sldId id="259" r:id="rId3"/>
-    <p:sldId id="263" r:id="rId4"/>
-    <p:sldId id="260" r:id="rId5"/>
-    <p:sldId id="261" r:id="rId6"/>
-    <p:sldId id="262" r:id="rId7"/>
-    <p:sldId id="264" r:id="rId8"/>
+    <p:sldId id="267" r:id="rId2"/>
+    <p:sldId id="258" r:id="rId3"/>
+    <p:sldId id="259" r:id="rId4"/>
+    <p:sldId id="263" r:id="rId5"/>
+    <p:sldId id="260" r:id="rId6"/>
+    <p:sldId id="261" r:id="rId7"/>
+    <p:sldId id="262" r:id="rId8"/>
+    <p:sldId id="264" r:id="rId9"/>
+    <p:sldId id="265" r:id="rId10"/>
+    <p:sldId id="266" r:id="rId11"/>
   </p:sldIdLst>
   <p:sldSz cx="12192000" cy="6858000"/>
   <p:notesSz cx="6858000" cy="9144000"/>
@@ -267,7 +270,7 @@
           <a:p>
             <a:fld id="{C4C33896-74DC-4DC9-8FFE-C8D9D6A25E64}" type="datetimeFigureOut">
               <a:rPr lang="en-SG" smtClean="0"/>
-              <a:t>20/5/2025</a:t>
+              <a:t>21/5/2025</a:t>
             </a:fld>
             <a:endParaRPr lang="en-SG"/>
           </a:p>
@@ -467,7 +470,7 @@
           <a:p>
             <a:fld id="{C4C33896-74DC-4DC9-8FFE-C8D9D6A25E64}" type="datetimeFigureOut">
               <a:rPr lang="en-SG" smtClean="0"/>
-              <a:t>20/5/2025</a:t>
+              <a:t>21/5/2025</a:t>
             </a:fld>
             <a:endParaRPr lang="en-SG"/>
           </a:p>
@@ -677,7 +680,7 @@
           <a:p>
             <a:fld id="{C4C33896-74DC-4DC9-8FFE-C8D9D6A25E64}" type="datetimeFigureOut">
               <a:rPr lang="en-SG" smtClean="0"/>
-              <a:t>20/5/2025</a:t>
+              <a:t>21/5/2025</a:t>
             </a:fld>
             <a:endParaRPr lang="en-SG"/>
           </a:p>
@@ -877,7 +880,7 @@
           <a:p>
             <a:fld id="{C4C33896-74DC-4DC9-8FFE-C8D9D6A25E64}" type="datetimeFigureOut">
               <a:rPr lang="en-SG" smtClean="0"/>
-              <a:t>20/5/2025</a:t>
+              <a:t>21/5/2025</a:t>
             </a:fld>
             <a:endParaRPr lang="en-SG"/>
           </a:p>
@@ -1153,7 +1156,7 @@
           <a:p>
             <a:fld id="{C4C33896-74DC-4DC9-8FFE-C8D9D6A25E64}" type="datetimeFigureOut">
               <a:rPr lang="en-SG" smtClean="0"/>
-              <a:t>20/5/2025</a:t>
+              <a:t>21/5/2025</a:t>
             </a:fld>
             <a:endParaRPr lang="en-SG"/>
           </a:p>
@@ -1421,7 +1424,7 @@
           <a:p>
             <a:fld id="{C4C33896-74DC-4DC9-8FFE-C8D9D6A25E64}" type="datetimeFigureOut">
               <a:rPr lang="en-SG" smtClean="0"/>
-              <a:t>20/5/2025</a:t>
+              <a:t>21/5/2025</a:t>
             </a:fld>
             <a:endParaRPr lang="en-SG"/>
           </a:p>
@@ -1836,7 +1839,7 @@
           <a:p>
             <a:fld id="{C4C33896-74DC-4DC9-8FFE-C8D9D6A25E64}" type="datetimeFigureOut">
               <a:rPr lang="en-SG" smtClean="0"/>
-              <a:t>20/5/2025</a:t>
+              <a:t>21/5/2025</a:t>
             </a:fld>
             <a:endParaRPr lang="en-SG"/>
           </a:p>
@@ -1978,7 +1981,7 @@
           <a:p>
             <a:fld id="{C4C33896-74DC-4DC9-8FFE-C8D9D6A25E64}" type="datetimeFigureOut">
               <a:rPr lang="en-SG" smtClean="0"/>
-              <a:t>20/5/2025</a:t>
+              <a:t>21/5/2025</a:t>
             </a:fld>
             <a:endParaRPr lang="en-SG"/>
           </a:p>
@@ -2091,7 +2094,7 @@
           <a:p>
             <a:fld id="{C4C33896-74DC-4DC9-8FFE-C8D9D6A25E64}" type="datetimeFigureOut">
               <a:rPr lang="en-SG" smtClean="0"/>
-              <a:t>20/5/2025</a:t>
+              <a:t>21/5/2025</a:t>
             </a:fld>
             <a:endParaRPr lang="en-SG"/>
           </a:p>
@@ -2404,7 +2407,7 @@
           <a:p>
             <a:fld id="{C4C33896-74DC-4DC9-8FFE-C8D9D6A25E64}" type="datetimeFigureOut">
               <a:rPr lang="en-SG" smtClean="0"/>
-              <a:t>20/5/2025</a:t>
+              <a:t>21/5/2025</a:t>
             </a:fld>
             <a:endParaRPr lang="en-SG"/>
           </a:p>
@@ -2693,7 +2696,7 @@
           <a:p>
             <a:fld id="{C4C33896-74DC-4DC9-8FFE-C8D9D6A25E64}" type="datetimeFigureOut">
               <a:rPr lang="en-SG" smtClean="0"/>
-              <a:t>20/5/2025</a:t>
+              <a:t>21/5/2025</a:t>
             </a:fld>
             <a:endParaRPr lang="en-SG"/>
           </a:p>
@@ -2936,7 +2939,7 @@
           <a:p>
             <a:fld id="{C4C33896-74DC-4DC9-8FFE-C8D9D6A25E64}" type="datetimeFigureOut">
               <a:rPr lang="en-SG" smtClean="0"/>
-              <a:t>20/5/2025</a:t>
+              <a:t>21/5/2025</a:t>
             </a:fld>
             <a:endParaRPr lang="en-SG"/>
           </a:p>
@@ -3337,6 +3340,827 @@
 </file>
 
 <file path=ppt/slides/slide1.xml><?xml version="1.0" encoding="utf-8"?>
+<p:sld xmlns:a="http://schemas.openxmlformats.org/drawingml/2006/main" xmlns:r="http://schemas.openxmlformats.org/officeDocument/2006/relationships" xmlns:p="http://schemas.openxmlformats.org/presentationml/2006/main">
+  <p:cSld>
+    <p:spTree>
+      <p:nvGrpSpPr>
+        <p:cNvPr id="1" name=""/>
+        <p:cNvGrpSpPr/>
+        <p:nvPr/>
+      </p:nvGrpSpPr>
+      <p:grpSpPr>
+        <a:xfrm>
+          <a:off x="0" y="0"/>
+          <a:ext cx="0" cy="0"/>
+          <a:chOff x="0" y="0"/>
+          <a:chExt cx="0" cy="0"/>
+        </a:xfrm>
+      </p:grpSpPr>
+      <p:grpSp>
+        <p:nvGrpSpPr>
+          <p:cNvPr id="27" name="Group 26">
+            <a:extLst>
+              <a:ext uri="{FF2B5EF4-FFF2-40B4-BE49-F238E27FC236}">
+                <a16:creationId xmlns:a16="http://schemas.microsoft.com/office/drawing/2014/main" id="{713BAADC-C7D8-59D9-C829-8FBA5E293235}"/>
+              </a:ext>
+            </a:extLst>
+          </p:cNvPr>
+          <p:cNvGrpSpPr/>
+          <p:nvPr/>
+        </p:nvGrpSpPr>
+        <p:grpSpPr>
+          <a:xfrm>
+            <a:off x="226145" y="432461"/>
+            <a:ext cx="11402953" cy="3720154"/>
+            <a:chOff x="226145" y="432461"/>
+            <a:chExt cx="11402953" cy="3720154"/>
+          </a:xfrm>
+        </p:grpSpPr>
+        <p:sp>
+          <p:nvSpPr>
+            <p:cNvPr id="10" name="Oval 9">
+              <a:extLst>
+                <a:ext uri="{FF2B5EF4-FFF2-40B4-BE49-F238E27FC236}">
+                  <a16:creationId xmlns:a16="http://schemas.microsoft.com/office/drawing/2014/main" id="{EDBAF1C4-3530-32BC-A34A-3253F2B77BED}"/>
+                </a:ext>
+              </a:extLst>
+            </p:cNvPr>
+            <p:cNvSpPr/>
+            <p:nvPr/>
+          </p:nvSpPr>
+          <p:spPr>
+            <a:xfrm>
+              <a:off x="4901380" y="432461"/>
+              <a:ext cx="2172927" cy="2172612"/>
+            </a:xfrm>
+            <a:prstGeom prst="ellipse">
+              <a:avLst/>
+            </a:prstGeom>
+            <a:solidFill>
+              <a:srgbClr val="660066"/>
+            </a:solidFill>
+          </p:spPr>
+          <p:style>
+            <a:lnRef idx="2">
+              <a:schemeClr val="accent1">
+                <a:shade val="15000"/>
+              </a:schemeClr>
+            </a:lnRef>
+            <a:fillRef idx="1">
+              <a:schemeClr val="accent1"/>
+            </a:fillRef>
+            <a:effectRef idx="0">
+              <a:schemeClr val="accent1"/>
+            </a:effectRef>
+            <a:fontRef idx="minor">
+              <a:schemeClr val="lt1"/>
+            </a:fontRef>
+          </p:style>
+          <p:txBody>
+            <a:bodyPr rtlCol="0" anchor="ctr"/>
+            <a:lstStyle/>
+            <a:p>
+              <a:pPr algn="ctr"/>
+              <a:r>
+                <a:rPr lang="en-US" dirty="0">
+                  <a:latin typeface="Lato" panose="020F0502020204030203" pitchFamily="34" charset="0"/>
+                  <a:ea typeface="Lato" panose="020F0502020204030203" pitchFamily="34" charset="0"/>
+                  <a:cs typeface="Lato" panose="020F0502020204030203" pitchFamily="34" charset="0"/>
+                </a:rPr>
+                <a:t>Return to collaborator cleaned / </a:t>
+              </a:r>
+              <a:r>
+                <a:rPr lang="en-US" dirty="0" err="1">
+                  <a:latin typeface="Lato" panose="020F0502020204030203" pitchFamily="34" charset="0"/>
+                  <a:ea typeface="Lato" panose="020F0502020204030203" pitchFamily="34" charset="0"/>
+                  <a:cs typeface="Lato" panose="020F0502020204030203" pitchFamily="34" charset="0"/>
+                </a:rPr>
+                <a:t>harmonised</a:t>
+              </a:r>
+              <a:r>
+                <a:rPr lang="en-US" dirty="0">
+                  <a:latin typeface="Lato" panose="020F0502020204030203" pitchFamily="34" charset="0"/>
+                  <a:ea typeface="Lato" panose="020F0502020204030203" pitchFamily="34" charset="0"/>
+                  <a:cs typeface="Lato" panose="020F0502020204030203" pitchFamily="34" charset="0"/>
+                </a:rPr>
+                <a:t> dataset and report</a:t>
+              </a:r>
+            </a:p>
+          </p:txBody>
+        </p:sp>
+        <p:sp>
+          <p:nvSpPr>
+            <p:cNvPr id="12" name="Rectangle 11">
+              <a:extLst>
+                <a:ext uri="{FF2B5EF4-FFF2-40B4-BE49-F238E27FC236}">
+                  <a16:creationId xmlns:a16="http://schemas.microsoft.com/office/drawing/2014/main" id="{90B80D38-D17C-1D0D-30E5-44EDBDAA4138}"/>
+                </a:ext>
+              </a:extLst>
+            </p:cNvPr>
+            <p:cNvSpPr/>
+            <p:nvPr/>
+          </p:nvSpPr>
+          <p:spPr>
+            <a:xfrm>
+              <a:off x="300500" y="2790027"/>
+              <a:ext cx="2024215" cy="643427"/>
+            </a:xfrm>
+            <a:prstGeom prst="rect">
+              <a:avLst/>
+            </a:prstGeom>
+            <a:solidFill>
+              <a:srgbClr val="003E2F"/>
+            </a:solidFill>
+          </p:spPr>
+          <p:style>
+            <a:lnRef idx="2">
+              <a:schemeClr val="accent1">
+                <a:shade val="15000"/>
+              </a:schemeClr>
+            </a:lnRef>
+            <a:fillRef idx="1">
+              <a:schemeClr val="accent1"/>
+            </a:fillRef>
+            <a:effectRef idx="0">
+              <a:schemeClr val="accent1"/>
+            </a:effectRef>
+            <a:fontRef idx="minor">
+              <a:schemeClr val="lt1"/>
+            </a:fontRef>
+          </p:style>
+          <p:txBody>
+            <a:bodyPr rtlCol="0" anchor="ctr"/>
+            <a:lstStyle/>
+            <a:p>
+              <a:pPr algn="ctr"/>
+              <a:r>
+                <a:rPr lang="en-US" sz="1400" dirty="0">
+                  <a:latin typeface="Lato" panose="020F0502020204030203" pitchFamily="34" charset="0"/>
+                  <a:ea typeface="Lato" panose="020F0502020204030203" pitchFamily="34" charset="0"/>
+                  <a:cs typeface="Lato" panose="020F0502020204030203" pitchFamily="34" charset="0"/>
+                </a:rPr>
+                <a:t>Provide a data dictionary</a:t>
+              </a:r>
+            </a:p>
+          </p:txBody>
+        </p:sp>
+        <p:sp>
+          <p:nvSpPr>
+            <p:cNvPr id="13" name="Rectangle 12">
+              <a:extLst>
+                <a:ext uri="{FF2B5EF4-FFF2-40B4-BE49-F238E27FC236}">
+                  <a16:creationId xmlns:a16="http://schemas.microsoft.com/office/drawing/2014/main" id="{D19E9D6B-F554-F98E-052A-99DB0D363AF6}"/>
+                </a:ext>
+              </a:extLst>
+            </p:cNvPr>
+            <p:cNvSpPr/>
+            <p:nvPr/>
+          </p:nvSpPr>
+          <p:spPr>
+            <a:xfrm>
+              <a:off x="300500" y="3509187"/>
+              <a:ext cx="2024215" cy="643427"/>
+            </a:xfrm>
+            <a:prstGeom prst="rect">
+              <a:avLst/>
+            </a:prstGeom>
+            <a:solidFill>
+              <a:srgbClr val="003E2F"/>
+            </a:solidFill>
+          </p:spPr>
+          <p:style>
+            <a:lnRef idx="2">
+              <a:schemeClr val="accent1">
+                <a:shade val="15000"/>
+              </a:schemeClr>
+            </a:lnRef>
+            <a:fillRef idx="1">
+              <a:schemeClr val="accent1"/>
+            </a:fillRef>
+            <a:effectRef idx="0">
+              <a:schemeClr val="accent1"/>
+            </a:effectRef>
+            <a:fontRef idx="minor">
+              <a:schemeClr val="lt1"/>
+            </a:fontRef>
+          </p:style>
+          <p:txBody>
+            <a:bodyPr rtlCol="0" anchor="ctr"/>
+            <a:lstStyle/>
+            <a:p>
+              <a:pPr algn="ctr"/>
+              <a:r>
+                <a:rPr lang="en-US" sz="1400" dirty="0">
+                  <a:latin typeface="Lato" panose="020F0502020204030203" pitchFamily="34" charset="0"/>
+                  <a:ea typeface="Lato" panose="020F0502020204030203" pitchFamily="34" charset="0"/>
+                  <a:cs typeface="Lato" panose="020F0502020204030203" pitchFamily="34" charset="0"/>
+                </a:rPr>
+                <a:t>Provide an input template file</a:t>
+              </a:r>
+              <a:endParaRPr lang="en-SG" sz="1400" dirty="0">
+                <a:latin typeface="Lato" panose="020F0502020204030203" pitchFamily="34" charset="0"/>
+                <a:ea typeface="Lato" panose="020F0502020204030203" pitchFamily="34" charset="0"/>
+                <a:cs typeface="Lato" panose="020F0502020204030203" pitchFamily="34" charset="0"/>
+              </a:endParaRPr>
+            </a:p>
+          </p:txBody>
+        </p:sp>
+        <p:sp>
+          <p:nvSpPr>
+            <p:cNvPr id="4" name="Oval 3">
+              <a:extLst>
+                <a:ext uri="{FF2B5EF4-FFF2-40B4-BE49-F238E27FC236}">
+                  <a16:creationId xmlns:a16="http://schemas.microsoft.com/office/drawing/2014/main" id="{A0B6C0A0-23D1-F701-6981-D0C62E91708F}"/>
+                </a:ext>
+              </a:extLst>
+            </p:cNvPr>
+            <p:cNvSpPr/>
+            <p:nvPr/>
+          </p:nvSpPr>
+          <p:spPr>
+            <a:xfrm>
+              <a:off x="226145" y="432461"/>
+              <a:ext cx="2172927" cy="2172612"/>
+            </a:xfrm>
+            <a:prstGeom prst="ellipse">
+              <a:avLst/>
+            </a:prstGeom>
+            <a:solidFill>
+              <a:srgbClr val="660066"/>
+            </a:solidFill>
+          </p:spPr>
+          <p:style>
+            <a:lnRef idx="2">
+              <a:schemeClr val="accent1">
+                <a:shade val="15000"/>
+              </a:schemeClr>
+            </a:lnRef>
+            <a:fillRef idx="1">
+              <a:schemeClr val="accent1"/>
+            </a:fillRef>
+            <a:effectRef idx="0">
+              <a:schemeClr val="accent1"/>
+            </a:effectRef>
+            <a:fontRef idx="minor">
+              <a:schemeClr val="lt1"/>
+            </a:fontRef>
+          </p:style>
+          <p:txBody>
+            <a:bodyPr rtlCol="0" anchor="ctr"/>
+            <a:lstStyle/>
+            <a:p>
+              <a:pPr algn="ctr"/>
+              <a:r>
+                <a:rPr lang="en-US" dirty="0">
+                  <a:latin typeface="Lato" panose="020F0502020204030203" pitchFamily="34" charset="0"/>
+                  <a:ea typeface="Lato" panose="020F0502020204030203" pitchFamily="34" charset="0"/>
+                  <a:cs typeface="Lato" panose="020F0502020204030203" pitchFamily="34" charset="0"/>
+                </a:rPr>
+                <a:t>Liaise with collaborator on what variables we need and collect them</a:t>
+              </a:r>
+            </a:p>
+          </p:txBody>
+        </p:sp>
+        <p:sp>
+          <p:nvSpPr>
+            <p:cNvPr id="11" name="Oval 10">
+              <a:extLst>
+                <a:ext uri="{FF2B5EF4-FFF2-40B4-BE49-F238E27FC236}">
+                  <a16:creationId xmlns:a16="http://schemas.microsoft.com/office/drawing/2014/main" id="{32F7A395-A419-937A-FFDE-15249254871C}"/>
+                </a:ext>
+              </a:extLst>
+            </p:cNvPr>
+            <p:cNvSpPr/>
+            <p:nvPr/>
+          </p:nvSpPr>
+          <p:spPr>
+            <a:xfrm>
+              <a:off x="9456171" y="432461"/>
+              <a:ext cx="2172927" cy="2172612"/>
+            </a:xfrm>
+            <a:prstGeom prst="ellipse">
+              <a:avLst/>
+            </a:prstGeom>
+            <a:solidFill>
+              <a:srgbClr val="660066"/>
+            </a:solidFill>
+          </p:spPr>
+          <p:style>
+            <a:lnRef idx="2">
+              <a:schemeClr val="accent1">
+                <a:shade val="15000"/>
+              </a:schemeClr>
+            </a:lnRef>
+            <a:fillRef idx="1">
+              <a:schemeClr val="accent1"/>
+            </a:fillRef>
+            <a:effectRef idx="0">
+              <a:schemeClr val="accent1"/>
+            </a:effectRef>
+            <a:fontRef idx="minor">
+              <a:schemeClr val="lt1"/>
+            </a:fontRef>
+          </p:style>
+          <p:txBody>
+            <a:bodyPr rtlCol="0" anchor="ctr"/>
+            <a:lstStyle/>
+            <a:p>
+              <a:pPr algn="ctr"/>
+              <a:r>
+                <a:rPr lang="en-US" dirty="0">
+                  <a:latin typeface="Lato" panose="020F0502020204030203" pitchFamily="34" charset="0"/>
+                  <a:ea typeface="Lato" panose="020F0502020204030203" pitchFamily="34" charset="0"/>
+                  <a:cs typeface="Lato" panose="020F0502020204030203" pitchFamily="34" charset="0"/>
+                </a:rPr>
+                <a:t>Provide analyst team combined data for further analysis </a:t>
+              </a:r>
+            </a:p>
+          </p:txBody>
+        </p:sp>
+        <p:cxnSp>
+          <p:nvCxnSpPr>
+            <p:cNvPr id="14" name="Straight Arrow Connector 13">
+              <a:extLst>
+                <a:ext uri="{FF2B5EF4-FFF2-40B4-BE49-F238E27FC236}">
+                  <a16:creationId xmlns:a16="http://schemas.microsoft.com/office/drawing/2014/main" id="{4CD1DD12-4EC6-DAD8-A340-8F1E3FF908D7}"/>
+                </a:ext>
+              </a:extLst>
+            </p:cNvPr>
+            <p:cNvCxnSpPr>
+              <a:cxnSpLocks/>
+              <a:stCxn id="4" idx="6"/>
+              <a:endCxn id="10" idx="2"/>
+            </p:cNvCxnSpPr>
+            <p:nvPr/>
+          </p:nvCxnSpPr>
+          <p:spPr>
+            <a:xfrm>
+              <a:off x="2399072" y="1518767"/>
+              <a:ext cx="2502308" cy="0"/>
+            </a:xfrm>
+            <a:prstGeom prst="straightConnector1">
+              <a:avLst/>
+            </a:prstGeom>
+            <a:ln w="57150">
+              <a:solidFill>
+                <a:schemeClr val="tx1"/>
+              </a:solidFill>
+              <a:tailEnd type="triangle"/>
+            </a:ln>
+          </p:spPr>
+          <p:style>
+            <a:lnRef idx="1">
+              <a:schemeClr val="accent1"/>
+            </a:lnRef>
+            <a:fillRef idx="0">
+              <a:schemeClr val="accent1"/>
+            </a:fillRef>
+            <a:effectRef idx="0">
+              <a:schemeClr val="accent1"/>
+            </a:effectRef>
+            <a:fontRef idx="minor">
+              <a:schemeClr val="tx1"/>
+            </a:fontRef>
+          </p:style>
+        </p:cxnSp>
+        <p:sp>
+          <p:nvSpPr>
+            <p:cNvPr id="18" name="Rectangle: Rounded Corners 17">
+              <a:extLst>
+                <a:ext uri="{FF2B5EF4-FFF2-40B4-BE49-F238E27FC236}">
+                  <a16:creationId xmlns:a16="http://schemas.microsoft.com/office/drawing/2014/main" id="{DA0A5165-C198-EAB3-DF20-C815371D3F87}"/>
+                </a:ext>
+              </a:extLst>
+            </p:cNvPr>
+            <p:cNvSpPr/>
+            <p:nvPr/>
+          </p:nvSpPr>
+          <p:spPr>
+            <a:xfrm>
+              <a:off x="2657175" y="578886"/>
+              <a:ext cx="1877955" cy="762900"/>
+            </a:xfrm>
+            <a:prstGeom prst="roundRect">
+              <a:avLst/>
+            </a:prstGeom>
+          </p:spPr>
+          <p:style>
+            <a:lnRef idx="2">
+              <a:schemeClr val="accent1">
+                <a:shade val="15000"/>
+              </a:schemeClr>
+            </a:lnRef>
+            <a:fillRef idx="1">
+              <a:schemeClr val="accent1"/>
+            </a:fillRef>
+            <a:effectRef idx="0">
+              <a:schemeClr val="accent1"/>
+            </a:effectRef>
+            <a:fontRef idx="minor">
+              <a:schemeClr val="lt1"/>
+            </a:fontRef>
+          </p:style>
+          <p:txBody>
+            <a:bodyPr rtlCol="0" anchor="ctr"/>
+            <a:lstStyle/>
+            <a:p>
+              <a:pPr algn="ctr"/>
+              <a:r>
+                <a:rPr lang="en-US" sz="1400" dirty="0" err="1">
+                  <a:latin typeface="Lato" panose="020F0502020204030203" pitchFamily="34" charset="0"/>
+                  <a:ea typeface="Lato" panose="020F0502020204030203" pitchFamily="34" charset="0"/>
+                  <a:cs typeface="Lato" panose="020F0502020204030203" pitchFamily="34" charset="0"/>
+                </a:rPr>
+                <a:t>Harmonise</a:t>
+              </a:r>
+              <a:r>
+                <a:rPr lang="en-US" sz="1400" dirty="0">
+                  <a:latin typeface="Lato" panose="020F0502020204030203" pitchFamily="34" charset="0"/>
+                  <a:ea typeface="Lato" panose="020F0502020204030203" pitchFamily="34" charset="0"/>
+                  <a:cs typeface="Lato" panose="020F0502020204030203" pitchFamily="34" charset="0"/>
+                </a:rPr>
+                <a:t> data provided from each collaborator</a:t>
+              </a:r>
+              <a:endParaRPr lang="en-SG" sz="1400" dirty="0">
+                <a:latin typeface="Lato" panose="020F0502020204030203" pitchFamily="34" charset="0"/>
+                <a:ea typeface="Lato" panose="020F0502020204030203" pitchFamily="34" charset="0"/>
+                <a:cs typeface="Lato" panose="020F0502020204030203" pitchFamily="34" charset="0"/>
+              </a:endParaRPr>
+            </a:p>
+          </p:txBody>
+        </p:sp>
+        <p:cxnSp>
+          <p:nvCxnSpPr>
+            <p:cNvPr id="19" name="Straight Arrow Connector 18">
+              <a:extLst>
+                <a:ext uri="{FF2B5EF4-FFF2-40B4-BE49-F238E27FC236}">
+                  <a16:creationId xmlns:a16="http://schemas.microsoft.com/office/drawing/2014/main" id="{24E0513D-2195-9608-431B-CE9B54CECC30}"/>
+                </a:ext>
+              </a:extLst>
+            </p:cNvPr>
+            <p:cNvCxnSpPr>
+              <a:cxnSpLocks/>
+              <a:stCxn id="10" idx="6"/>
+              <a:endCxn id="11" idx="2"/>
+            </p:cNvCxnSpPr>
+            <p:nvPr/>
+          </p:nvCxnSpPr>
+          <p:spPr>
+            <a:xfrm>
+              <a:off x="7074307" y="1518767"/>
+              <a:ext cx="2381864" cy="0"/>
+            </a:xfrm>
+            <a:prstGeom prst="straightConnector1">
+              <a:avLst/>
+            </a:prstGeom>
+            <a:ln w="57150">
+              <a:solidFill>
+                <a:schemeClr val="tx1"/>
+              </a:solidFill>
+              <a:tailEnd type="triangle"/>
+            </a:ln>
+          </p:spPr>
+          <p:style>
+            <a:lnRef idx="1">
+              <a:schemeClr val="accent1"/>
+            </a:lnRef>
+            <a:fillRef idx="0">
+              <a:schemeClr val="accent1"/>
+            </a:fillRef>
+            <a:effectRef idx="0">
+              <a:schemeClr val="accent1"/>
+            </a:effectRef>
+            <a:fontRef idx="minor">
+              <a:schemeClr val="tx1"/>
+            </a:fontRef>
+          </p:style>
+        </p:cxnSp>
+        <p:sp>
+          <p:nvSpPr>
+            <p:cNvPr id="22" name="Rectangle 21">
+              <a:extLst>
+                <a:ext uri="{FF2B5EF4-FFF2-40B4-BE49-F238E27FC236}">
+                  <a16:creationId xmlns:a16="http://schemas.microsoft.com/office/drawing/2014/main" id="{8C1E4CE9-CDD7-1251-2D8C-353283556657}"/>
+                </a:ext>
+              </a:extLst>
+            </p:cNvPr>
+            <p:cNvSpPr/>
+            <p:nvPr/>
+          </p:nvSpPr>
+          <p:spPr>
+            <a:xfrm>
+              <a:off x="4901380" y="2790027"/>
+              <a:ext cx="2172927" cy="643426"/>
+            </a:xfrm>
+            <a:prstGeom prst="rect">
+              <a:avLst/>
+            </a:prstGeom>
+            <a:solidFill>
+              <a:srgbClr val="003E2F"/>
+            </a:solidFill>
+          </p:spPr>
+          <p:style>
+            <a:lnRef idx="2">
+              <a:schemeClr val="accent1">
+                <a:shade val="15000"/>
+              </a:schemeClr>
+            </a:lnRef>
+            <a:fillRef idx="1">
+              <a:schemeClr val="accent1"/>
+            </a:fillRef>
+            <a:effectRef idx="0">
+              <a:schemeClr val="accent1"/>
+            </a:effectRef>
+            <a:fontRef idx="minor">
+              <a:schemeClr val="lt1"/>
+            </a:fontRef>
+          </p:style>
+          <p:txBody>
+            <a:bodyPr rtlCol="0" anchor="ctr"/>
+            <a:lstStyle/>
+            <a:p>
+              <a:pPr algn="ctr"/>
+              <a:r>
+                <a:rPr lang="en-US" sz="1400" dirty="0">
+                  <a:latin typeface="Lato" panose="020F0502020204030203" pitchFamily="34" charset="0"/>
+                  <a:ea typeface="Lato" panose="020F0502020204030203" pitchFamily="34" charset="0"/>
+                  <a:cs typeface="Lato" panose="020F0502020204030203" pitchFamily="34" charset="0"/>
+                </a:rPr>
+                <a:t>Return harmonized data and data dictionary</a:t>
+              </a:r>
+            </a:p>
+          </p:txBody>
+        </p:sp>
+        <p:sp>
+          <p:nvSpPr>
+            <p:cNvPr id="23" name="Rectangle 22">
+              <a:extLst>
+                <a:ext uri="{FF2B5EF4-FFF2-40B4-BE49-F238E27FC236}">
+                  <a16:creationId xmlns:a16="http://schemas.microsoft.com/office/drawing/2014/main" id="{FCB32665-B1EA-C18C-597A-BB9DF00B4924}"/>
+                </a:ext>
+              </a:extLst>
+            </p:cNvPr>
+            <p:cNvSpPr/>
+            <p:nvPr/>
+          </p:nvSpPr>
+          <p:spPr>
+            <a:xfrm>
+              <a:off x="4901380" y="3509188"/>
+              <a:ext cx="2172927" cy="643427"/>
+            </a:xfrm>
+            <a:prstGeom prst="rect">
+              <a:avLst/>
+            </a:prstGeom>
+            <a:solidFill>
+              <a:srgbClr val="003E2F"/>
+            </a:solidFill>
+          </p:spPr>
+          <p:style>
+            <a:lnRef idx="2">
+              <a:schemeClr val="accent1">
+                <a:shade val="15000"/>
+              </a:schemeClr>
+            </a:lnRef>
+            <a:fillRef idx="1">
+              <a:schemeClr val="accent1"/>
+            </a:fillRef>
+            <a:effectRef idx="0">
+              <a:schemeClr val="accent1"/>
+            </a:effectRef>
+            <a:fontRef idx="minor">
+              <a:schemeClr val="lt1"/>
+            </a:fontRef>
+          </p:style>
+          <p:txBody>
+            <a:bodyPr rtlCol="0" anchor="ctr"/>
+            <a:lstStyle/>
+            <a:p>
+              <a:pPr algn="ctr"/>
+              <a:r>
+                <a:rPr lang="en-US" sz="1400" dirty="0">
+                  <a:latin typeface="Lato" panose="020F0502020204030203" pitchFamily="34" charset="0"/>
+                  <a:ea typeface="Lato" panose="020F0502020204030203" pitchFamily="34" charset="0"/>
+                  <a:cs typeface="Lato" panose="020F0502020204030203" pitchFamily="34" charset="0"/>
+                </a:rPr>
+                <a:t>Return cleaning/ harmonization report</a:t>
+              </a:r>
+              <a:endParaRPr lang="en-SG" sz="1400" dirty="0">
+                <a:latin typeface="Lato" panose="020F0502020204030203" pitchFamily="34" charset="0"/>
+                <a:ea typeface="Lato" panose="020F0502020204030203" pitchFamily="34" charset="0"/>
+                <a:cs typeface="Lato" panose="020F0502020204030203" pitchFamily="34" charset="0"/>
+              </a:endParaRPr>
+            </a:p>
+          </p:txBody>
+        </p:sp>
+        <p:sp>
+          <p:nvSpPr>
+            <p:cNvPr id="24" name="Rectangle: Rounded Corners 23">
+              <a:extLst>
+                <a:ext uri="{FF2B5EF4-FFF2-40B4-BE49-F238E27FC236}">
+                  <a16:creationId xmlns:a16="http://schemas.microsoft.com/office/drawing/2014/main" id="{FB1B901D-24CE-218D-FFD6-E19E42C6B79C}"/>
+                </a:ext>
+              </a:extLst>
+            </p:cNvPr>
+            <p:cNvSpPr/>
+            <p:nvPr/>
+          </p:nvSpPr>
+          <p:spPr>
+            <a:xfrm>
+              <a:off x="7326261" y="553989"/>
+              <a:ext cx="1877955" cy="787797"/>
+            </a:xfrm>
+            <a:prstGeom prst="roundRect">
+              <a:avLst/>
+            </a:prstGeom>
+          </p:spPr>
+          <p:style>
+            <a:lnRef idx="2">
+              <a:schemeClr val="accent1">
+                <a:shade val="15000"/>
+              </a:schemeClr>
+            </a:lnRef>
+            <a:fillRef idx="1">
+              <a:schemeClr val="accent1"/>
+            </a:fillRef>
+            <a:effectRef idx="0">
+              <a:schemeClr val="accent1"/>
+            </a:effectRef>
+            <a:fontRef idx="minor">
+              <a:schemeClr val="lt1"/>
+            </a:fontRef>
+          </p:style>
+          <p:txBody>
+            <a:bodyPr rtlCol="0" anchor="ctr"/>
+            <a:lstStyle/>
+            <a:p>
+              <a:pPr algn="ctr"/>
+              <a:r>
+                <a:rPr lang="en-US" sz="1400" dirty="0">
+                  <a:latin typeface="Lato" panose="020F0502020204030203" pitchFamily="34" charset="0"/>
+                  <a:ea typeface="Lato" panose="020F0502020204030203" pitchFamily="34" charset="0"/>
+                  <a:cs typeface="Lato" panose="020F0502020204030203" pitchFamily="34" charset="0"/>
+                </a:rPr>
+                <a:t>Combine/Filter harmonized data from all cohorts </a:t>
+              </a:r>
+              <a:endParaRPr lang="en-SG" sz="1400" dirty="0">
+                <a:latin typeface="Lato" panose="020F0502020204030203" pitchFamily="34" charset="0"/>
+                <a:ea typeface="Lato" panose="020F0502020204030203" pitchFamily="34" charset="0"/>
+                <a:cs typeface="Lato" panose="020F0502020204030203" pitchFamily="34" charset="0"/>
+              </a:endParaRPr>
+            </a:p>
+          </p:txBody>
+        </p:sp>
+        <p:sp>
+          <p:nvSpPr>
+            <p:cNvPr id="25" name="Rectangle 24">
+              <a:extLst>
+                <a:ext uri="{FF2B5EF4-FFF2-40B4-BE49-F238E27FC236}">
+                  <a16:creationId xmlns:a16="http://schemas.microsoft.com/office/drawing/2014/main" id="{10429252-860A-0DE0-A8AA-1D3E0E54E8CB}"/>
+                </a:ext>
+              </a:extLst>
+            </p:cNvPr>
+            <p:cNvSpPr/>
+            <p:nvPr/>
+          </p:nvSpPr>
+          <p:spPr>
+            <a:xfrm>
+              <a:off x="9530526" y="2785574"/>
+              <a:ext cx="2024215" cy="643427"/>
+            </a:xfrm>
+            <a:prstGeom prst="rect">
+              <a:avLst/>
+            </a:prstGeom>
+            <a:solidFill>
+              <a:srgbClr val="003E2F"/>
+            </a:solidFill>
+          </p:spPr>
+          <p:style>
+            <a:lnRef idx="2">
+              <a:schemeClr val="accent1">
+                <a:shade val="15000"/>
+              </a:schemeClr>
+            </a:lnRef>
+            <a:fillRef idx="1">
+              <a:schemeClr val="accent1"/>
+            </a:fillRef>
+            <a:effectRef idx="0">
+              <a:schemeClr val="accent1"/>
+            </a:effectRef>
+            <a:fontRef idx="minor">
+              <a:schemeClr val="lt1"/>
+            </a:fontRef>
+          </p:style>
+          <p:txBody>
+            <a:bodyPr rtlCol="0" anchor="ctr"/>
+            <a:lstStyle/>
+            <a:p>
+              <a:pPr algn="ctr"/>
+              <a:r>
+                <a:rPr lang="en-US" sz="1400" dirty="0">
+                  <a:latin typeface="Lato" panose="020F0502020204030203" pitchFamily="34" charset="0"/>
+                  <a:ea typeface="Lato" panose="020F0502020204030203" pitchFamily="34" charset="0"/>
+                  <a:cs typeface="Lato" panose="020F0502020204030203" pitchFamily="34" charset="0"/>
+                </a:rPr>
+                <a:t>Send harmonized/ filtered data for study</a:t>
+              </a:r>
+            </a:p>
+          </p:txBody>
+        </p:sp>
+      </p:grpSp>
+    </p:spTree>
+    <p:extLst>
+      <p:ext uri="{BB962C8B-B14F-4D97-AF65-F5344CB8AC3E}">
+        <p14:creationId xmlns:p14="http://schemas.microsoft.com/office/powerpoint/2010/main" val="2811018039"/>
+      </p:ext>
+    </p:extLst>
+  </p:cSld>
+  <p:clrMapOvr>
+    <a:masterClrMapping/>
+  </p:clrMapOvr>
+</p:sld>
+</file>
+
+<file path=ppt/slides/slide10.xml><?xml version="1.0" encoding="utf-8"?>
+<p:sld xmlns:a="http://schemas.openxmlformats.org/drawingml/2006/main" xmlns:r="http://schemas.openxmlformats.org/officeDocument/2006/relationships" xmlns:p="http://schemas.openxmlformats.org/presentationml/2006/main">
+  <p:cSld>
+    <p:spTree>
+      <p:nvGrpSpPr>
+        <p:cNvPr id="1" name=""/>
+        <p:cNvGrpSpPr/>
+        <p:nvPr/>
+      </p:nvGrpSpPr>
+      <p:grpSpPr>
+        <a:xfrm>
+          <a:off x="0" y="0"/>
+          <a:ext cx="0" cy="0"/>
+          <a:chOff x="0" y="0"/>
+          <a:chExt cx="0" cy="0"/>
+        </a:xfrm>
+      </p:grpSpPr>
+      <p:sp>
+        <p:nvSpPr>
+          <p:cNvPr id="2" name="Title 1">
+            <a:extLst>
+              <a:ext uri="{FF2B5EF4-FFF2-40B4-BE49-F238E27FC236}">
+                <a16:creationId xmlns:a16="http://schemas.microsoft.com/office/drawing/2014/main" id="{2DFF2438-5740-EEC1-0BC8-86095A74E7AD}"/>
+              </a:ext>
+            </a:extLst>
+          </p:cNvPr>
+          <p:cNvSpPr>
+            <a:spLocks noGrp="1"/>
+          </p:cNvSpPr>
+          <p:nvPr>
+            <p:ph type="title"/>
+          </p:nvPr>
+        </p:nvSpPr>
+        <p:spPr/>
+        <p:txBody>
+          <a:bodyPr/>
+          <a:lstStyle/>
+          <a:p>
+            <a:endParaRPr lang="en-SG"/>
+          </a:p>
+        </p:txBody>
+      </p:sp>
+      <p:sp>
+        <p:nvSpPr>
+          <p:cNvPr id="3" name="Content Placeholder 2">
+            <a:extLst>
+              <a:ext uri="{FF2B5EF4-FFF2-40B4-BE49-F238E27FC236}">
+                <a16:creationId xmlns:a16="http://schemas.microsoft.com/office/drawing/2014/main" id="{084E494F-D18B-E7CE-D5BE-89193606D1D3}"/>
+              </a:ext>
+            </a:extLst>
+          </p:cNvPr>
+          <p:cNvSpPr>
+            <a:spLocks noGrp="1"/>
+          </p:cNvSpPr>
+          <p:nvPr>
+            <p:ph idx="1"/>
+          </p:nvPr>
+        </p:nvSpPr>
+        <p:spPr/>
+        <p:txBody>
+          <a:bodyPr/>
+          <a:lstStyle/>
+          <a:p>
+            <a:endParaRPr lang="en-SG"/>
+          </a:p>
+        </p:txBody>
+      </p:sp>
+    </p:spTree>
+    <p:extLst>
+      <p:ext uri="{BB962C8B-B14F-4D97-AF65-F5344CB8AC3E}">
+        <p14:creationId xmlns:p14="http://schemas.microsoft.com/office/powerpoint/2010/main" val="2306458636"/>
+      </p:ext>
+    </p:extLst>
+  </p:cSld>
+  <p:clrMapOvr>
+    <a:masterClrMapping/>
+  </p:clrMapOvr>
+</p:sld>
+</file>
+
+<file path=ppt/slides/slide2.xml><?xml version="1.0" encoding="utf-8"?>
 <p:sld xmlns:a="http://schemas.openxmlformats.org/drawingml/2006/main" xmlns:r="http://schemas.openxmlformats.org/officeDocument/2006/relationships" xmlns:p="http://schemas.openxmlformats.org/presentationml/2006/main">
   <p:cSld>
     <p:spTree>
@@ -3982,7 +4806,7 @@
 </p:sld>
 </file>
 
-<file path=ppt/slides/slide2.xml><?xml version="1.0" encoding="utf-8"?>
+<file path=ppt/slides/slide3.xml><?xml version="1.0" encoding="utf-8"?>
 <p:sld xmlns:a="http://schemas.openxmlformats.org/drawingml/2006/main" xmlns:r="http://schemas.openxmlformats.org/officeDocument/2006/relationships" xmlns:p="http://schemas.openxmlformats.org/presentationml/2006/main">
   <p:cSld>
     <p:spTree>
@@ -4154,7 +4978,7 @@
 </p:sld>
 </file>
 
-<file path=ppt/slides/slide3.xml><?xml version="1.0" encoding="utf-8"?>
+<file path=ppt/slides/slide4.xml><?xml version="1.0" encoding="utf-8"?>
 <p:sld xmlns:a="http://schemas.openxmlformats.org/drawingml/2006/main" xmlns:r="http://schemas.openxmlformats.org/officeDocument/2006/relationships" xmlns:p="http://schemas.openxmlformats.org/presentationml/2006/main">
   <p:cSld>
     <p:spTree>
@@ -4213,7 +5037,7 @@
 </p:sld>
 </file>
 
-<file path=ppt/slides/slide4.xml><?xml version="1.0" encoding="utf-8"?>
+<file path=ppt/slides/slide5.xml><?xml version="1.0" encoding="utf-8"?>
 <p:sld xmlns:a="http://schemas.openxmlformats.org/drawingml/2006/main" xmlns:r="http://schemas.openxmlformats.org/officeDocument/2006/relationships" xmlns:p="http://schemas.openxmlformats.org/presentationml/2006/main">
   <p:cSld>
     <p:spTree>
@@ -4425,7 +5249,7 @@
 </p:sld>
 </file>
 
-<file path=ppt/slides/slide5.xml><?xml version="1.0" encoding="utf-8"?>
+<file path=ppt/slides/slide6.xml><?xml version="1.0" encoding="utf-8"?>
 <p:sld xmlns:a="http://schemas.openxmlformats.org/drawingml/2006/main" xmlns:r="http://schemas.openxmlformats.org/officeDocument/2006/relationships" xmlns:p="http://schemas.openxmlformats.org/presentationml/2006/main">
   <p:cSld>
     <p:spTree>
@@ -4552,7 +5376,7 @@
 </p:sld>
 </file>
 
-<file path=ppt/slides/slide6.xml><?xml version="1.0" encoding="utf-8"?>
+<file path=ppt/slides/slide7.xml><?xml version="1.0" encoding="utf-8"?>
 <p:sld xmlns:a="http://schemas.openxmlformats.org/drawingml/2006/main" xmlns:r="http://schemas.openxmlformats.org/officeDocument/2006/relationships" xmlns:p="http://schemas.openxmlformats.org/presentationml/2006/main">
   <p:cSld>
     <p:spTree>
@@ -4678,7 +5502,7 @@
 </p:sld>
 </file>
 
-<file path=ppt/slides/slide7.xml><?xml version="1.0" encoding="utf-8"?>
+<file path=ppt/slides/slide8.xml><?xml version="1.0" encoding="utf-8"?>
 <p:sld xmlns:a="http://schemas.openxmlformats.org/drawingml/2006/main" xmlns:r="http://schemas.openxmlformats.org/officeDocument/2006/relationships" xmlns:p="http://schemas.openxmlformats.org/presentationml/2006/main">
   <p:cSld>
     <p:spTree>
@@ -4735,6 +5559,186 @@
     <p:extLst>
       <p:ext uri="{BB962C8B-B14F-4D97-AF65-F5344CB8AC3E}">
         <p14:creationId xmlns:p14="http://schemas.microsoft.com/office/powerpoint/2010/main" val="3615868238"/>
+      </p:ext>
+    </p:extLst>
+  </p:cSld>
+  <p:clrMapOvr>
+    <a:masterClrMapping/>
+  </p:clrMapOvr>
+</p:sld>
+</file>
+
+<file path=ppt/slides/slide9.xml><?xml version="1.0" encoding="utf-8"?>
+<p:sld xmlns:a="http://schemas.openxmlformats.org/drawingml/2006/main" xmlns:r="http://schemas.openxmlformats.org/officeDocument/2006/relationships" xmlns:p="http://schemas.openxmlformats.org/presentationml/2006/main">
+  <p:cSld>
+    <p:spTree>
+      <p:nvGrpSpPr>
+        <p:cNvPr id="1" name=""/>
+        <p:cNvGrpSpPr/>
+        <p:nvPr/>
+      </p:nvGrpSpPr>
+      <p:grpSpPr>
+        <a:xfrm>
+          <a:off x="0" y="0"/>
+          <a:ext cx="0" cy="0"/>
+          <a:chOff x="0" y="0"/>
+          <a:chExt cx="0" cy="0"/>
+        </a:xfrm>
+      </p:grpSpPr>
+      <p:sp>
+        <p:nvSpPr>
+          <p:cNvPr id="5" name="TextBox 4">
+            <a:extLst>
+              <a:ext uri="{FF2B5EF4-FFF2-40B4-BE49-F238E27FC236}">
+                <a16:creationId xmlns:a16="http://schemas.microsoft.com/office/drawing/2014/main" id="{B50709E8-5E3B-3E70-968C-B1AE440576C9}"/>
+              </a:ext>
+            </a:extLst>
+          </p:cNvPr>
+          <p:cNvSpPr txBox="1"/>
+          <p:nvPr/>
+        </p:nvSpPr>
+        <p:spPr>
+          <a:xfrm>
+            <a:off x="2900516" y="620731"/>
+            <a:ext cx="6096000" cy="646331"/>
+          </a:xfrm>
+          <a:prstGeom prst="rect">
+            <a:avLst/>
+          </a:prstGeom>
+          <a:noFill/>
+        </p:spPr>
+        <p:txBody>
+          <a:bodyPr wrap="square">
+            <a:spAutoFit/>
+          </a:bodyPr>
+          <a:lstStyle/>
+          <a:p>
+            <a:r>
+              <a:rPr lang="en-SG" dirty="0"/>
+              <a:t>https://www.vecteezy.com/vector-art/464863-businessman-kneel-on-floor-with-pointing-finger-to-him</a:t>
+            </a:r>
+          </a:p>
+        </p:txBody>
+      </p:sp>
+      <p:sp>
+        <p:nvSpPr>
+          <p:cNvPr id="7" name="TextBox 6">
+            <a:extLst>
+              <a:ext uri="{FF2B5EF4-FFF2-40B4-BE49-F238E27FC236}">
+                <a16:creationId xmlns:a16="http://schemas.microsoft.com/office/drawing/2014/main" id="{CC992FF0-1BC3-05FE-80A4-E19F9BED825F}"/>
+              </a:ext>
+            </a:extLst>
+          </p:cNvPr>
+          <p:cNvSpPr txBox="1"/>
+          <p:nvPr/>
+        </p:nvSpPr>
+        <p:spPr>
+          <a:xfrm>
+            <a:off x="3048000" y="3108293"/>
+            <a:ext cx="6096000" cy="1077218"/>
+          </a:xfrm>
+          <a:prstGeom prst="rect">
+            <a:avLst/>
+          </a:prstGeom>
+          <a:noFill/>
+        </p:spPr>
+        <p:txBody>
+          <a:bodyPr wrap="square">
+            <a:spAutoFit/>
+          </a:bodyPr>
+          <a:lstStyle/>
+          <a:p>
+            <a:pPr algn="ctr">
+              <a:spcBef>
+                <a:spcPts val="1200"/>
+              </a:spcBef>
+            </a:pPr>
+            <a:r>
+              <a:rPr lang="en-US" b="0" i="0" dirty="0">
+                <a:solidFill>
+                  <a:srgbClr val="9FA7AD"/>
+                </a:solidFill>
+                <a:effectLst/>
+                <a:latin typeface="system-ui"/>
+              </a:rPr>
+              <a:t>Businessman kneel on floor with pointing finger to him Free Vector </a:t>
+            </a:r>
+            <a:r>
+              <a:rPr lang="en-SG" sz="1800" b="0" i="0" u="none" strike="noStrike" baseline="0" dirty="0" err="1">
+                <a:solidFill>
+                  <a:srgbClr val="6E7B85"/>
+                </a:solidFill>
+                <a:latin typeface="Inter-Regular"/>
+              </a:rPr>
+              <a:t>Vecteezy</a:t>
+            </a:r>
+            <a:r>
+              <a:rPr lang="en-SG" sz="1800" b="0" i="0" u="none" strike="noStrike" baseline="0" dirty="0">
+                <a:solidFill>
+                  <a:srgbClr val="6E7B85"/>
+                </a:solidFill>
+                <a:latin typeface="Inter-Regular"/>
+              </a:rPr>
+              <a:t>! </a:t>
+            </a:r>
+            <a:r>
+              <a:rPr lang="en-SG" b="1" i="0" dirty="0" err="1">
+                <a:solidFill>
+                  <a:srgbClr val="0E2332"/>
+                </a:solidFill>
+                <a:effectLst/>
+                <a:latin typeface="system-ui"/>
+              </a:rPr>
+              <a:t>Amonrat</a:t>
+            </a:r>
+            <a:r>
+              <a:rPr lang="en-SG" b="1" i="0" dirty="0">
+                <a:solidFill>
+                  <a:srgbClr val="0E2332"/>
+                </a:solidFill>
+                <a:effectLst/>
+                <a:latin typeface="system-ui"/>
+              </a:rPr>
+              <a:t> </a:t>
+            </a:r>
+            <a:r>
+              <a:rPr lang="en-SG" b="1" i="0" dirty="0" err="1">
+                <a:solidFill>
+                  <a:srgbClr val="0E2332"/>
+                </a:solidFill>
+                <a:effectLst/>
+                <a:latin typeface="system-ui"/>
+              </a:rPr>
+              <a:t>Rungreangfangsai</a:t>
+            </a:r>
+            <a:endParaRPr lang="en-SG" b="1" i="0" dirty="0">
+              <a:solidFill>
+                <a:srgbClr val="0E2332"/>
+              </a:solidFill>
+              <a:effectLst/>
+              <a:latin typeface="system-ui"/>
+            </a:endParaRPr>
+          </a:p>
+          <a:p>
+            <a:pPr algn="ctr">
+              <a:spcBef>
+                <a:spcPts val="1200"/>
+              </a:spcBef>
+            </a:pPr>
+            <a:endParaRPr lang="en-US" b="0" i="0" dirty="0">
+              <a:solidFill>
+                <a:srgbClr val="9FA7AD"/>
+              </a:solidFill>
+              <a:effectLst/>
+              <a:latin typeface="system-ui"/>
+            </a:endParaRPr>
+          </a:p>
+        </p:txBody>
+      </p:sp>
+    </p:spTree>
+    <p:extLst>
+      <p:ext uri="{BB962C8B-B14F-4D97-AF65-F5344CB8AC3E}">
+        <p14:creationId xmlns:p14="http://schemas.microsoft.com/office/powerpoint/2010/main" val="1900755580"/>
       </p:ext>
     </p:extLst>
   </p:cSld>

</xml_diff>

<commit_message>
Add slides on report output.
</commit_message>
<xml_diff>
--- a/images/image_maker.pptx
+++ b/images/image_maker.pptx
@@ -15,6 +15,11 @@
     <p:sldId id="264" r:id="rId9"/>
     <p:sldId id="265" r:id="rId10"/>
     <p:sldId id="266" r:id="rId11"/>
+    <p:sldId id="268" r:id="rId12"/>
+    <p:sldId id="269" r:id="rId13"/>
+    <p:sldId id="270" r:id="rId14"/>
+    <p:sldId id="271" r:id="rId15"/>
+    <p:sldId id="272" r:id="rId16"/>
   </p:sldIdLst>
   <p:sldSz cx="12192000" cy="6858000"/>
   <p:notesSz cx="6858000" cy="9144000"/>
@@ -270,7 +275,7 @@
           <a:p>
             <a:fld id="{C4C33896-74DC-4DC9-8FFE-C8D9D6A25E64}" type="datetimeFigureOut">
               <a:rPr lang="en-SG" smtClean="0"/>
-              <a:t>21/5/2025</a:t>
+              <a:t>23/5/2025</a:t>
             </a:fld>
             <a:endParaRPr lang="en-SG"/>
           </a:p>
@@ -470,7 +475,7 @@
           <a:p>
             <a:fld id="{C4C33896-74DC-4DC9-8FFE-C8D9D6A25E64}" type="datetimeFigureOut">
               <a:rPr lang="en-SG" smtClean="0"/>
-              <a:t>21/5/2025</a:t>
+              <a:t>23/5/2025</a:t>
             </a:fld>
             <a:endParaRPr lang="en-SG"/>
           </a:p>
@@ -680,7 +685,7 @@
           <a:p>
             <a:fld id="{C4C33896-74DC-4DC9-8FFE-C8D9D6A25E64}" type="datetimeFigureOut">
               <a:rPr lang="en-SG" smtClean="0"/>
-              <a:t>21/5/2025</a:t>
+              <a:t>23/5/2025</a:t>
             </a:fld>
             <a:endParaRPr lang="en-SG"/>
           </a:p>
@@ -880,7 +885,7 @@
           <a:p>
             <a:fld id="{C4C33896-74DC-4DC9-8FFE-C8D9D6A25E64}" type="datetimeFigureOut">
               <a:rPr lang="en-SG" smtClean="0"/>
-              <a:t>21/5/2025</a:t>
+              <a:t>23/5/2025</a:t>
             </a:fld>
             <a:endParaRPr lang="en-SG"/>
           </a:p>
@@ -1156,7 +1161,7 @@
           <a:p>
             <a:fld id="{C4C33896-74DC-4DC9-8FFE-C8D9D6A25E64}" type="datetimeFigureOut">
               <a:rPr lang="en-SG" smtClean="0"/>
-              <a:t>21/5/2025</a:t>
+              <a:t>23/5/2025</a:t>
             </a:fld>
             <a:endParaRPr lang="en-SG"/>
           </a:p>
@@ -1424,7 +1429,7 @@
           <a:p>
             <a:fld id="{C4C33896-74DC-4DC9-8FFE-C8D9D6A25E64}" type="datetimeFigureOut">
               <a:rPr lang="en-SG" smtClean="0"/>
-              <a:t>21/5/2025</a:t>
+              <a:t>23/5/2025</a:t>
             </a:fld>
             <a:endParaRPr lang="en-SG"/>
           </a:p>
@@ -1839,7 +1844,7 @@
           <a:p>
             <a:fld id="{C4C33896-74DC-4DC9-8FFE-C8D9D6A25E64}" type="datetimeFigureOut">
               <a:rPr lang="en-SG" smtClean="0"/>
-              <a:t>21/5/2025</a:t>
+              <a:t>23/5/2025</a:t>
             </a:fld>
             <a:endParaRPr lang="en-SG"/>
           </a:p>
@@ -1981,7 +1986,7 @@
           <a:p>
             <a:fld id="{C4C33896-74DC-4DC9-8FFE-C8D9D6A25E64}" type="datetimeFigureOut">
               <a:rPr lang="en-SG" smtClean="0"/>
-              <a:t>21/5/2025</a:t>
+              <a:t>23/5/2025</a:t>
             </a:fld>
             <a:endParaRPr lang="en-SG"/>
           </a:p>
@@ -2094,7 +2099,7 @@
           <a:p>
             <a:fld id="{C4C33896-74DC-4DC9-8FFE-C8D9D6A25E64}" type="datetimeFigureOut">
               <a:rPr lang="en-SG" smtClean="0"/>
-              <a:t>21/5/2025</a:t>
+              <a:t>23/5/2025</a:t>
             </a:fld>
             <a:endParaRPr lang="en-SG"/>
           </a:p>
@@ -2407,7 +2412,7 @@
           <a:p>
             <a:fld id="{C4C33896-74DC-4DC9-8FFE-C8D9D6A25E64}" type="datetimeFigureOut">
               <a:rPr lang="en-SG" smtClean="0"/>
-              <a:t>21/5/2025</a:t>
+              <a:t>23/5/2025</a:t>
             </a:fld>
             <a:endParaRPr lang="en-SG"/>
           </a:p>
@@ -2696,7 +2701,7 @@
           <a:p>
             <a:fld id="{C4C33896-74DC-4DC9-8FFE-C8D9D6A25E64}" type="datetimeFigureOut">
               <a:rPr lang="en-SG" smtClean="0"/>
-              <a:t>21/5/2025</a:t>
+              <a:t>23/5/2025</a:t>
             </a:fld>
             <a:endParaRPr lang="en-SG"/>
           </a:p>
@@ -2939,7 +2944,7 @@
           <a:p>
             <a:fld id="{C4C33896-74DC-4DC9-8FFE-C8D9D6A25E64}" type="datetimeFigureOut">
               <a:rPr lang="en-SG" smtClean="0"/>
-              <a:t>21/5/2025</a:t>
+              <a:t>23/5/2025</a:t>
             </a:fld>
             <a:endParaRPr lang="en-SG"/>
           </a:p>
@@ -4097,60 +4102,636 @@
           <a:chExt cx="0" cy="0"/>
         </a:xfrm>
       </p:grpSpPr>
-      <p:sp>
-        <p:nvSpPr>
-          <p:cNvPr id="2" name="Title 1">
-            <a:extLst>
-              <a:ext uri="{FF2B5EF4-FFF2-40B4-BE49-F238E27FC236}">
-                <a16:creationId xmlns:a16="http://schemas.microsoft.com/office/drawing/2014/main" id="{2DFF2438-5740-EEC1-0BC8-86095A74E7AD}"/>
-              </a:ext>
-            </a:extLst>
-          </p:cNvPr>
-          <p:cNvSpPr>
-            <a:spLocks noGrp="1"/>
-          </p:cNvSpPr>
-          <p:nvPr>
-            <p:ph type="title"/>
-          </p:nvPr>
-        </p:nvSpPr>
-        <p:spPr/>
-        <p:txBody>
-          <a:bodyPr/>
-          <a:lstStyle/>
-          <a:p>
-            <a:endParaRPr lang="en-SG"/>
-          </a:p>
-        </p:txBody>
-      </p:sp>
-      <p:sp>
-        <p:nvSpPr>
-          <p:cNvPr id="3" name="Content Placeholder 2">
-            <a:extLst>
-              <a:ext uri="{FF2B5EF4-FFF2-40B4-BE49-F238E27FC236}">
-                <a16:creationId xmlns:a16="http://schemas.microsoft.com/office/drawing/2014/main" id="{084E494F-D18B-E7CE-D5BE-89193606D1D3}"/>
-              </a:ext>
-            </a:extLst>
-          </p:cNvPr>
-          <p:cNvSpPr>
-            <a:spLocks noGrp="1"/>
-          </p:cNvSpPr>
-          <p:nvPr>
-            <p:ph idx="1"/>
-          </p:nvPr>
-        </p:nvSpPr>
-        <p:spPr/>
-        <p:txBody>
-          <a:bodyPr/>
-          <a:lstStyle/>
-          <a:p>
-            <a:endParaRPr lang="en-SG"/>
-          </a:p>
-        </p:txBody>
-      </p:sp>
+      <p:pic>
+        <p:nvPicPr>
+          <p:cNvPr id="5" name="Picture 4">
+            <a:extLst>
+              <a:ext uri="{FF2B5EF4-FFF2-40B4-BE49-F238E27FC236}">
+                <a16:creationId xmlns:a16="http://schemas.microsoft.com/office/drawing/2014/main" id="{4DD01E60-9EAD-5CEF-0D3B-46FCBE3E1E5E}"/>
+              </a:ext>
+            </a:extLst>
+          </p:cNvPr>
+          <p:cNvPicPr>
+            <a:picLocks noChangeAspect="1"/>
+          </p:cNvPicPr>
+          <p:nvPr/>
+        </p:nvPicPr>
+        <p:blipFill>
+          <a:blip r:embed="rId2"/>
+          <a:stretch>
+            <a:fillRect/>
+          </a:stretch>
+        </p:blipFill>
+        <p:spPr>
+          <a:xfrm>
+            <a:off x="655245" y="1744834"/>
+            <a:ext cx="4549534" cy="3368332"/>
+          </a:xfrm>
+          <a:prstGeom prst="rect">
+            <a:avLst/>
+          </a:prstGeom>
+        </p:spPr>
+      </p:pic>
+      <p:pic>
+        <p:nvPicPr>
+          <p:cNvPr id="9" name="Picture 8">
+            <a:extLst>
+              <a:ext uri="{FF2B5EF4-FFF2-40B4-BE49-F238E27FC236}">
+                <a16:creationId xmlns:a16="http://schemas.microsoft.com/office/drawing/2014/main" id="{77241BA4-923A-E8D7-E0A9-1698ABB0657D}"/>
+              </a:ext>
+            </a:extLst>
+          </p:cNvPr>
+          <p:cNvPicPr>
+            <a:picLocks noChangeAspect="1"/>
+          </p:cNvPicPr>
+          <p:nvPr/>
+        </p:nvPicPr>
+        <p:blipFill>
+          <a:blip r:embed="rId3"/>
+          <a:stretch>
+            <a:fillRect/>
+          </a:stretch>
+        </p:blipFill>
+        <p:spPr>
+          <a:xfrm>
+            <a:off x="6013826" y="1744834"/>
+            <a:ext cx="4568553" cy="3368332"/>
+          </a:xfrm>
+          <a:prstGeom prst="rect">
+            <a:avLst/>
+          </a:prstGeom>
+        </p:spPr>
+      </p:pic>
     </p:spTree>
     <p:extLst>
       <p:ext uri="{BB962C8B-B14F-4D97-AF65-F5344CB8AC3E}">
         <p14:creationId xmlns:p14="http://schemas.microsoft.com/office/powerpoint/2010/main" val="2306458636"/>
+      </p:ext>
+    </p:extLst>
+  </p:cSld>
+  <p:clrMapOvr>
+    <a:masterClrMapping/>
+  </p:clrMapOvr>
+</p:sld>
+</file>
+
+<file path=ppt/slides/slide11.xml><?xml version="1.0" encoding="utf-8"?>
+<p:sld xmlns:a="http://schemas.openxmlformats.org/drawingml/2006/main" xmlns:r="http://schemas.openxmlformats.org/officeDocument/2006/relationships" xmlns:p="http://schemas.openxmlformats.org/presentationml/2006/main">
+  <p:cSld>
+    <p:spTree>
+      <p:nvGrpSpPr>
+        <p:cNvPr id="1" name=""/>
+        <p:cNvGrpSpPr/>
+        <p:nvPr/>
+      </p:nvGrpSpPr>
+      <p:grpSpPr>
+        <a:xfrm>
+          <a:off x="0" y="0"/>
+          <a:ext cx="0" cy="0"/>
+          <a:chOff x="0" y="0"/>
+          <a:chExt cx="0" cy="0"/>
+        </a:xfrm>
+      </p:grpSpPr>
+      <p:pic>
+        <p:nvPicPr>
+          <p:cNvPr id="5" name="Picture 4">
+            <a:extLst>
+              <a:ext uri="{FF2B5EF4-FFF2-40B4-BE49-F238E27FC236}">
+                <a16:creationId xmlns:a16="http://schemas.microsoft.com/office/drawing/2014/main" id="{7729A11F-8FA8-76D9-8C44-C36AE585AD00}"/>
+              </a:ext>
+            </a:extLst>
+          </p:cNvPr>
+          <p:cNvPicPr>
+            <a:picLocks noChangeAspect="1"/>
+          </p:cNvPicPr>
+          <p:nvPr/>
+        </p:nvPicPr>
+        <p:blipFill>
+          <a:blip r:embed="rId2"/>
+          <a:stretch>
+            <a:fillRect/>
+          </a:stretch>
+        </p:blipFill>
+        <p:spPr>
+          <a:xfrm>
+            <a:off x="2209438" y="868882"/>
+            <a:ext cx="6885402" cy="5120235"/>
+          </a:xfrm>
+          <a:prstGeom prst="rect">
+            <a:avLst/>
+          </a:prstGeom>
+        </p:spPr>
+      </p:pic>
+    </p:spTree>
+    <p:extLst>
+      <p:ext uri="{BB962C8B-B14F-4D97-AF65-F5344CB8AC3E}">
+        <p14:creationId xmlns:p14="http://schemas.microsoft.com/office/powerpoint/2010/main" val="988539792"/>
+      </p:ext>
+    </p:extLst>
+  </p:cSld>
+  <p:clrMapOvr>
+    <a:masterClrMapping/>
+  </p:clrMapOvr>
+</p:sld>
+</file>
+
+<file path=ppt/slides/slide12.xml><?xml version="1.0" encoding="utf-8"?>
+<p:sld xmlns:a="http://schemas.openxmlformats.org/drawingml/2006/main" xmlns:r="http://schemas.openxmlformats.org/officeDocument/2006/relationships" xmlns:p="http://schemas.openxmlformats.org/presentationml/2006/main">
+  <p:cSld>
+    <p:spTree>
+      <p:nvGrpSpPr>
+        <p:cNvPr id="1" name=""/>
+        <p:cNvGrpSpPr/>
+        <p:nvPr/>
+      </p:nvGrpSpPr>
+      <p:grpSpPr>
+        <a:xfrm>
+          <a:off x="0" y="0"/>
+          <a:ext cx="0" cy="0"/>
+          <a:chOff x="0" y="0"/>
+          <a:chExt cx="0" cy="0"/>
+        </a:xfrm>
+      </p:grpSpPr>
+      <p:grpSp>
+        <p:nvGrpSpPr>
+          <p:cNvPr id="11" name="Group 10">
+            <a:extLst>
+              <a:ext uri="{FF2B5EF4-FFF2-40B4-BE49-F238E27FC236}">
+                <a16:creationId xmlns:a16="http://schemas.microsoft.com/office/drawing/2014/main" id="{03BFE45A-539F-47A0-57F6-AF395D90583A}"/>
+              </a:ext>
+            </a:extLst>
+          </p:cNvPr>
+          <p:cNvGrpSpPr/>
+          <p:nvPr/>
+        </p:nvGrpSpPr>
+        <p:grpSpPr>
+          <a:xfrm>
+            <a:off x="2383085" y="857760"/>
+            <a:ext cx="5852667" cy="5708767"/>
+            <a:chOff x="2383085" y="857760"/>
+            <a:chExt cx="5852667" cy="5708767"/>
+          </a:xfrm>
+        </p:grpSpPr>
+        <p:pic>
+          <p:nvPicPr>
+            <p:cNvPr id="5" name="Picture 4">
+              <a:extLst>
+                <a:ext uri="{FF2B5EF4-FFF2-40B4-BE49-F238E27FC236}">
+                  <a16:creationId xmlns:a16="http://schemas.microsoft.com/office/drawing/2014/main" id="{AFC012F9-2192-7588-2E20-34B19C1E6455}"/>
+                </a:ext>
+              </a:extLst>
+            </p:cNvPr>
+            <p:cNvPicPr>
+              <a:picLocks noChangeAspect="1"/>
+            </p:cNvPicPr>
+            <p:nvPr/>
+          </p:nvPicPr>
+          <p:blipFill>
+            <a:blip r:embed="rId2"/>
+            <a:stretch>
+              <a:fillRect/>
+            </a:stretch>
+          </p:blipFill>
+          <p:spPr>
+            <a:xfrm>
+              <a:off x="2383085" y="2474232"/>
+              <a:ext cx="5852667" cy="4092295"/>
+            </a:xfrm>
+            <a:prstGeom prst="rect">
+              <a:avLst/>
+            </a:prstGeom>
+          </p:spPr>
+        </p:pic>
+        <p:pic>
+          <p:nvPicPr>
+            <p:cNvPr id="10" name="Picture 9">
+              <a:extLst>
+                <a:ext uri="{FF2B5EF4-FFF2-40B4-BE49-F238E27FC236}">
+                  <a16:creationId xmlns:a16="http://schemas.microsoft.com/office/drawing/2014/main" id="{6E3893B1-811B-5D24-266E-0A38EEB5A485}"/>
+                </a:ext>
+              </a:extLst>
+            </p:cNvPr>
+            <p:cNvPicPr>
+              <a:picLocks noChangeAspect="1"/>
+            </p:cNvPicPr>
+            <p:nvPr/>
+          </p:nvPicPr>
+          <p:blipFill>
+            <a:blip r:embed="rId3"/>
+            <a:stretch>
+              <a:fillRect/>
+            </a:stretch>
+          </p:blipFill>
+          <p:spPr>
+            <a:xfrm>
+              <a:off x="2388442" y="857760"/>
+              <a:ext cx="5847310" cy="1616472"/>
+            </a:xfrm>
+            <a:prstGeom prst="rect">
+              <a:avLst/>
+            </a:prstGeom>
+          </p:spPr>
+        </p:pic>
+      </p:grpSp>
+    </p:spTree>
+    <p:extLst>
+      <p:ext uri="{BB962C8B-B14F-4D97-AF65-F5344CB8AC3E}">
+        <p14:creationId xmlns:p14="http://schemas.microsoft.com/office/powerpoint/2010/main" val="2381397133"/>
+      </p:ext>
+    </p:extLst>
+  </p:cSld>
+  <p:clrMapOvr>
+    <a:masterClrMapping/>
+  </p:clrMapOvr>
+</p:sld>
+</file>
+
+<file path=ppt/slides/slide13.xml><?xml version="1.0" encoding="utf-8"?>
+<p:sld xmlns:a="http://schemas.openxmlformats.org/drawingml/2006/main" xmlns:r="http://schemas.openxmlformats.org/officeDocument/2006/relationships" xmlns:p="http://schemas.openxmlformats.org/presentationml/2006/main">
+  <p:cSld>
+    <p:spTree>
+      <p:nvGrpSpPr>
+        <p:cNvPr id="1" name=""/>
+        <p:cNvGrpSpPr/>
+        <p:nvPr/>
+      </p:nvGrpSpPr>
+      <p:grpSpPr>
+        <a:xfrm>
+          <a:off x="0" y="0"/>
+          <a:ext cx="0" cy="0"/>
+          <a:chOff x="0" y="0"/>
+          <a:chExt cx="0" cy="0"/>
+        </a:xfrm>
+      </p:grpSpPr>
+      <p:grpSp>
+        <p:nvGrpSpPr>
+          <p:cNvPr id="12" name="Group 11">
+            <a:extLst>
+              <a:ext uri="{FF2B5EF4-FFF2-40B4-BE49-F238E27FC236}">
+                <a16:creationId xmlns:a16="http://schemas.microsoft.com/office/drawing/2014/main" id="{38D4D41C-5DA9-E9F3-0BA3-93B766D4299E}"/>
+              </a:ext>
+            </a:extLst>
+          </p:cNvPr>
+          <p:cNvGrpSpPr/>
+          <p:nvPr/>
+        </p:nvGrpSpPr>
+        <p:grpSpPr>
+          <a:xfrm>
+            <a:off x="818692" y="293098"/>
+            <a:ext cx="10554615" cy="6271803"/>
+            <a:chOff x="818692" y="293098"/>
+            <a:chExt cx="10554615" cy="6271803"/>
+          </a:xfrm>
+        </p:grpSpPr>
+        <p:pic>
+          <p:nvPicPr>
+            <p:cNvPr id="3" name="Picture 2">
+              <a:extLst>
+                <a:ext uri="{FF2B5EF4-FFF2-40B4-BE49-F238E27FC236}">
+                  <a16:creationId xmlns:a16="http://schemas.microsoft.com/office/drawing/2014/main" id="{9CAE24B9-E779-19F1-79D4-DFA5A3B55742}"/>
+                </a:ext>
+              </a:extLst>
+            </p:cNvPr>
+            <p:cNvPicPr>
+              <a:picLocks noChangeAspect="1"/>
+            </p:cNvPicPr>
+            <p:nvPr/>
+          </p:nvPicPr>
+          <p:blipFill>
+            <a:blip r:embed="rId2"/>
+            <a:stretch>
+              <a:fillRect/>
+            </a:stretch>
+          </p:blipFill>
+          <p:spPr>
+            <a:xfrm>
+              <a:off x="818692" y="293098"/>
+              <a:ext cx="10554615" cy="6271803"/>
+            </a:xfrm>
+            <a:prstGeom prst="rect">
+              <a:avLst/>
+            </a:prstGeom>
+          </p:spPr>
+        </p:pic>
+        <p:cxnSp>
+          <p:nvCxnSpPr>
+            <p:cNvPr id="5" name="Straight Arrow Connector 4">
+              <a:extLst>
+                <a:ext uri="{FF2B5EF4-FFF2-40B4-BE49-F238E27FC236}">
+                  <a16:creationId xmlns:a16="http://schemas.microsoft.com/office/drawing/2014/main" id="{6FAD1C8C-5C46-ABBC-53E7-4691EAEE6A5B}"/>
+                </a:ext>
+              </a:extLst>
+            </p:cNvPr>
+            <p:cNvCxnSpPr>
+              <a:cxnSpLocks/>
+            </p:cNvCxnSpPr>
+            <p:nvPr/>
+          </p:nvCxnSpPr>
+          <p:spPr>
+            <a:xfrm flipH="1">
+              <a:off x="1710813" y="2094271"/>
+              <a:ext cx="5338916" cy="2045110"/>
+            </a:xfrm>
+            <a:prstGeom prst="straightConnector1">
+              <a:avLst/>
+            </a:prstGeom>
+            <a:ln w="57150">
+              <a:solidFill>
+                <a:srgbClr val="016D55"/>
+              </a:solidFill>
+              <a:tailEnd type="triangle"/>
+            </a:ln>
+          </p:spPr>
+          <p:style>
+            <a:lnRef idx="1">
+              <a:schemeClr val="accent1"/>
+            </a:lnRef>
+            <a:fillRef idx="0">
+              <a:schemeClr val="accent1"/>
+            </a:fillRef>
+            <a:effectRef idx="0">
+              <a:schemeClr val="accent1"/>
+            </a:effectRef>
+            <a:fontRef idx="minor">
+              <a:schemeClr val="tx1"/>
+            </a:fontRef>
+          </p:style>
+        </p:cxnSp>
+      </p:grpSp>
+    </p:spTree>
+    <p:extLst>
+      <p:ext uri="{BB962C8B-B14F-4D97-AF65-F5344CB8AC3E}">
+        <p14:creationId xmlns:p14="http://schemas.microsoft.com/office/powerpoint/2010/main" val="2633294683"/>
+      </p:ext>
+    </p:extLst>
+  </p:cSld>
+  <p:clrMapOvr>
+    <a:masterClrMapping/>
+  </p:clrMapOvr>
+</p:sld>
+</file>
+
+<file path=ppt/slides/slide14.xml><?xml version="1.0" encoding="utf-8"?>
+<p:sld xmlns:a="http://schemas.openxmlformats.org/drawingml/2006/main" xmlns:r="http://schemas.openxmlformats.org/officeDocument/2006/relationships" xmlns:p="http://schemas.openxmlformats.org/presentationml/2006/main">
+  <p:cSld>
+    <p:spTree>
+      <p:nvGrpSpPr>
+        <p:cNvPr id="1" name="">
+          <a:extLst>
+            <a:ext uri="{FF2B5EF4-FFF2-40B4-BE49-F238E27FC236}">
+              <a16:creationId xmlns:a16="http://schemas.microsoft.com/office/drawing/2014/main" id="{BFD2831E-B863-5AC2-0441-6486FDA8D3F1}"/>
+            </a:ext>
+          </a:extLst>
+        </p:cNvPr>
+        <p:cNvGrpSpPr/>
+        <p:nvPr/>
+      </p:nvGrpSpPr>
+      <p:grpSpPr>
+        <a:xfrm>
+          <a:off x="0" y="0"/>
+          <a:ext cx="0" cy="0"/>
+          <a:chOff x="0" y="0"/>
+          <a:chExt cx="0" cy="0"/>
+        </a:xfrm>
+      </p:grpSpPr>
+      <p:grpSp>
+        <p:nvGrpSpPr>
+          <p:cNvPr id="6" name="Group 5">
+            <a:extLst>
+              <a:ext uri="{FF2B5EF4-FFF2-40B4-BE49-F238E27FC236}">
+                <a16:creationId xmlns:a16="http://schemas.microsoft.com/office/drawing/2014/main" id="{6B5B6EF6-A404-149B-9C97-A081A50EF32E}"/>
+              </a:ext>
+            </a:extLst>
+          </p:cNvPr>
+          <p:cNvGrpSpPr/>
+          <p:nvPr/>
+        </p:nvGrpSpPr>
+        <p:grpSpPr>
+          <a:xfrm>
+            <a:off x="818692" y="293098"/>
+            <a:ext cx="10554615" cy="6271803"/>
+            <a:chOff x="818692" y="293098"/>
+            <a:chExt cx="10554615" cy="6271803"/>
+          </a:xfrm>
+        </p:grpSpPr>
+        <p:pic>
+          <p:nvPicPr>
+            <p:cNvPr id="3" name="Picture 2">
+              <a:extLst>
+                <a:ext uri="{FF2B5EF4-FFF2-40B4-BE49-F238E27FC236}">
+                  <a16:creationId xmlns:a16="http://schemas.microsoft.com/office/drawing/2014/main" id="{797C729E-F83B-4539-BC0C-2B2C69C28C35}"/>
+                </a:ext>
+              </a:extLst>
+            </p:cNvPr>
+            <p:cNvPicPr>
+              <a:picLocks noChangeAspect="1"/>
+            </p:cNvPicPr>
+            <p:nvPr/>
+          </p:nvPicPr>
+          <p:blipFill>
+            <a:blip r:embed="rId2"/>
+            <a:stretch>
+              <a:fillRect/>
+            </a:stretch>
+          </p:blipFill>
+          <p:spPr>
+            <a:xfrm>
+              <a:off x="818692" y="293098"/>
+              <a:ext cx="10554615" cy="6271803"/>
+            </a:xfrm>
+            <a:prstGeom prst="rect">
+              <a:avLst/>
+            </a:prstGeom>
+          </p:spPr>
+        </p:pic>
+        <p:cxnSp>
+          <p:nvCxnSpPr>
+            <p:cNvPr id="5" name="Straight Arrow Connector 4">
+              <a:extLst>
+                <a:ext uri="{FF2B5EF4-FFF2-40B4-BE49-F238E27FC236}">
+                  <a16:creationId xmlns:a16="http://schemas.microsoft.com/office/drawing/2014/main" id="{21624F1C-EE26-1BBC-AE57-EDC9C13CB133}"/>
+                </a:ext>
+              </a:extLst>
+            </p:cNvPr>
+            <p:cNvCxnSpPr>
+              <a:cxnSpLocks/>
+            </p:cNvCxnSpPr>
+            <p:nvPr/>
+          </p:nvCxnSpPr>
+          <p:spPr>
+            <a:xfrm flipH="1" flipV="1">
+              <a:off x="1799303" y="2792361"/>
+              <a:ext cx="5250426" cy="2172929"/>
+            </a:xfrm>
+            <a:prstGeom prst="straightConnector1">
+              <a:avLst/>
+            </a:prstGeom>
+            <a:ln w="57150">
+              <a:solidFill>
+                <a:srgbClr val="016D55"/>
+              </a:solidFill>
+              <a:tailEnd type="triangle"/>
+            </a:ln>
+          </p:spPr>
+          <p:style>
+            <a:lnRef idx="1">
+              <a:schemeClr val="accent1"/>
+            </a:lnRef>
+            <a:fillRef idx="0">
+              <a:schemeClr val="accent1"/>
+            </a:fillRef>
+            <a:effectRef idx="0">
+              <a:schemeClr val="accent1"/>
+            </a:effectRef>
+            <a:fontRef idx="minor">
+              <a:schemeClr val="tx1"/>
+            </a:fontRef>
+          </p:style>
+        </p:cxnSp>
+      </p:grpSp>
+    </p:spTree>
+    <p:extLst>
+      <p:ext uri="{BB962C8B-B14F-4D97-AF65-F5344CB8AC3E}">
+        <p14:creationId xmlns:p14="http://schemas.microsoft.com/office/powerpoint/2010/main" val="2578181733"/>
+      </p:ext>
+    </p:extLst>
+  </p:cSld>
+  <p:clrMapOvr>
+    <a:masterClrMapping/>
+  </p:clrMapOvr>
+</p:sld>
+</file>
+
+<file path=ppt/slides/slide15.xml><?xml version="1.0" encoding="utf-8"?>
+<p:sld xmlns:a="http://schemas.openxmlformats.org/drawingml/2006/main" xmlns:r="http://schemas.openxmlformats.org/officeDocument/2006/relationships" xmlns:p="http://schemas.openxmlformats.org/presentationml/2006/main">
+  <p:cSld>
+    <p:spTree>
+      <p:nvGrpSpPr>
+        <p:cNvPr id="1" name=""/>
+        <p:cNvGrpSpPr/>
+        <p:nvPr/>
+      </p:nvGrpSpPr>
+      <p:grpSpPr>
+        <a:xfrm>
+          <a:off x="0" y="0"/>
+          <a:ext cx="0" cy="0"/>
+          <a:chOff x="0" y="0"/>
+          <a:chExt cx="0" cy="0"/>
+        </a:xfrm>
+      </p:grpSpPr>
+      <p:grpSp>
+        <p:nvGrpSpPr>
+          <p:cNvPr id="7" name="Group 6">
+            <a:extLst>
+              <a:ext uri="{FF2B5EF4-FFF2-40B4-BE49-F238E27FC236}">
+                <a16:creationId xmlns:a16="http://schemas.microsoft.com/office/drawing/2014/main" id="{25A603E8-80B2-30E7-3AEA-108B0564ED48}"/>
+              </a:ext>
+            </a:extLst>
+          </p:cNvPr>
+          <p:cNvGrpSpPr/>
+          <p:nvPr/>
+        </p:nvGrpSpPr>
+        <p:grpSpPr>
+          <a:xfrm>
+            <a:off x="864930" y="-145648"/>
+            <a:ext cx="9195646" cy="6146819"/>
+            <a:chOff x="864930" y="-145648"/>
+            <a:chExt cx="9195646" cy="6146819"/>
+          </a:xfrm>
+        </p:grpSpPr>
+        <p:pic>
+          <p:nvPicPr>
+            <p:cNvPr id="3" name="Picture 2">
+              <a:extLst>
+                <a:ext uri="{FF2B5EF4-FFF2-40B4-BE49-F238E27FC236}">
+                  <a16:creationId xmlns:a16="http://schemas.microsoft.com/office/drawing/2014/main" id="{D637C249-8E11-CF67-58E7-0D565A8E5787}"/>
+                </a:ext>
+              </a:extLst>
+            </p:cNvPr>
+            <p:cNvPicPr>
+              <a:picLocks noChangeAspect="1"/>
+            </p:cNvPicPr>
+            <p:nvPr/>
+          </p:nvPicPr>
+          <p:blipFill>
+            <a:blip r:embed="rId2"/>
+            <a:srcRect b="53313"/>
+            <a:stretch/>
+          </p:blipFill>
+          <p:spPr>
+            <a:xfrm>
+              <a:off x="864930" y="3179800"/>
+              <a:ext cx="4802003" cy="2746871"/>
+            </a:xfrm>
+            <a:prstGeom prst="rect">
+              <a:avLst/>
+            </a:prstGeom>
+          </p:spPr>
+        </p:pic>
+        <p:pic>
+          <p:nvPicPr>
+            <p:cNvPr id="5" name="Picture 4">
+              <a:extLst>
+                <a:ext uri="{FF2B5EF4-FFF2-40B4-BE49-F238E27FC236}">
+                  <a16:creationId xmlns:a16="http://schemas.microsoft.com/office/drawing/2014/main" id="{A149F68B-4CE3-AEDD-8936-E01265152B97}"/>
+                </a:ext>
+              </a:extLst>
+            </p:cNvPr>
+            <p:cNvPicPr>
+              <a:picLocks noChangeAspect="1"/>
+            </p:cNvPicPr>
+            <p:nvPr/>
+          </p:nvPicPr>
+          <p:blipFill>
+            <a:blip r:embed="rId3"/>
+            <a:stretch>
+              <a:fillRect/>
+            </a:stretch>
+          </p:blipFill>
+          <p:spPr>
+            <a:xfrm>
+              <a:off x="867106" y="-145648"/>
+              <a:ext cx="9191294" cy="3325449"/>
+            </a:xfrm>
+            <a:prstGeom prst="rect">
+              <a:avLst/>
+            </a:prstGeom>
+          </p:spPr>
+        </p:pic>
+        <p:pic>
+          <p:nvPicPr>
+            <p:cNvPr id="6" name="Picture 5">
+              <a:extLst>
+                <a:ext uri="{FF2B5EF4-FFF2-40B4-BE49-F238E27FC236}">
+                  <a16:creationId xmlns:a16="http://schemas.microsoft.com/office/drawing/2014/main" id="{2DEB5E07-7B64-2976-6EDF-CB2D3B8C0CBB}"/>
+                </a:ext>
+              </a:extLst>
+            </p:cNvPr>
+            <p:cNvPicPr>
+              <a:picLocks noChangeAspect="1"/>
+            </p:cNvPicPr>
+            <p:nvPr/>
+          </p:nvPicPr>
+          <p:blipFill>
+            <a:blip r:embed="rId2"/>
+            <a:srcRect t="47591" b="-1"/>
+            <a:stretch/>
+          </p:blipFill>
+          <p:spPr>
+            <a:xfrm>
+              <a:off x="5666933" y="3179801"/>
+              <a:ext cx="4393643" cy="2821370"/>
+            </a:xfrm>
+            <a:prstGeom prst="rect">
+              <a:avLst/>
+            </a:prstGeom>
+          </p:spPr>
+        </p:pic>
+      </p:grpSp>
+    </p:spTree>
+    <p:extLst>
+      <p:ext uri="{BB962C8B-B14F-4D97-AF65-F5344CB8AC3E}">
+        <p14:creationId xmlns:p14="http://schemas.microsoft.com/office/powerpoint/2010/main" val="1976288168"/>
       </p:ext>
     </p:extLst>
   </p:cSld>

</xml_diff>

<commit_message>
Update smoke history mapping.
</commit_message>
<xml_diff>
--- a/images/image_maker.pptx
+++ b/images/image_maker.pptx
@@ -279,7 +279,7 @@
           <a:p>
             <a:fld id="{C4C33896-74DC-4DC9-8FFE-C8D9D6A25E64}" type="datetimeFigureOut">
               <a:rPr lang="en-SG" smtClean="0"/>
-              <a:t>25/5/2025</a:t>
+              <a:t>29/5/2025</a:t>
             </a:fld>
             <a:endParaRPr lang="en-SG"/>
           </a:p>
@@ -479,7 +479,7 @@
           <a:p>
             <a:fld id="{C4C33896-74DC-4DC9-8FFE-C8D9D6A25E64}" type="datetimeFigureOut">
               <a:rPr lang="en-SG" smtClean="0"/>
-              <a:t>25/5/2025</a:t>
+              <a:t>29/5/2025</a:t>
             </a:fld>
             <a:endParaRPr lang="en-SG"/>
           </a:p>
@@ -689,7 +689,7 @@
           <a:p>
             <a:fld id="{C4C33896-74DC-4DC9-8FFE-C8D9D6A25E64}" type="datetimeFigureOut">
               <a:rPr lang="en-SG" smtClean="0"/>
-              <a:t>25/5/2025</a:t>
+              <a:t>29/5/2025</a:t>
             </a:fld>
             <a:endParaRPr lang="en-SG"/>
           </a:p>
@@ -889,7 +889,7 @@
           <a:p>
             <a:fld id="{C4C33896-74DC-4DC9-8FFE-C8D9D6A25E64}" type="datetimeFigureOut">
               <a:rPr lang="en-SG" smtClean="0"/>
-              <a:t>25/5/2025</a:t>
+              <a:t>29/5/2025</a:t>
             </a:fld>
             <a:endParaRPr lang="en-SG"/>
           </a:p>
@@ -1165,7 +1165,7 @@
           <a:p>
             <a:fld id="{C4C33896-74DC-4DC9-8FFE-C8D9D6A25E64}" type="datetimeFigureOut">
               <a:rPr lang="en-SG" smtClean="0"/>
-              <a:t>25/5/2025</a:t>
+              <a:t>29/5/2025</a:t>
             </a:fld>
             <a:endParaRPr lang="en-SG"/>
           </a:p>
@@ -1433,7 +1433,7 @@
           <a:p>
             <a:fld id="{C4C33896-74DC-4DC9-8FFE-C8D9D6A25E64}" type="datetimeFigureOut">
               <a:rPr lang="en-SG" smtClean="0"/>
-              <a:t>25/5/2025</a:t>
+              <a:t>29/5/2025</a:t>
             </a:fld>
             <a:endParaRPr lang="en-SG"/>
           </a:p>
@@ -1848,7 +1848,7 @@
           <a:p>
             <a:fld id="{C4C33896-74DC-4DC9-8FFE-C8D9D6A25E64}" type="datetimeFigureOut">
               <a:rPr lang="en-SG" smtClean="0"/>
-              <a:t>25/5/2025</a:t>
+              <a:t>29/5/2025</a:t>
             </a:fld>
             <a:endParaRPr lang="en-SG"/>
           </a:p>
@@ -1990,7 +1990,7 @@
           <a:p>
             <a:fld id="{C4C33896-74DC-4DC9-8FFE-C8D9D6A25E64}" type="datetimeFigureOut">
               <a:rPr lang="en-SG" smtClean="0"/>
-              <a:t>25/5/2025</a:t>
+              <a:t>29/5/2025</a:t>
             </a:fld>
             <a:endParaRPr lang="en-SG"/>
           </a:p>
@@ -2103,7 +2103,7 @@
           <a:p>
             <a:fld id="{C4C33896-74DC-4DC9-8FFE-C8D9D6A25E64}" type="datetimeFigureOut">
               <a:rPr lang="en-SG" smtClean="0"/>
-              <a:t>25/5/2025</a:t>
+              <a:t>29/5/2025</a:t>
             </a:fld>
             <a:endParaRPr lang="en-SG"/>
           </a:p>
@@ -2416,7 +2416,7 @@
           <a:p>
             <a:fld id="{C4C33896-74DC-4DC9-8FFE-C8D9D6A25E64}" type="datetimeFigureOut">
               <a:rPr lang="en-SG" smtClean="0"/>
-              <a:t>25/5/2025</a:t>
+              <a:t>29/5/2025</a:t>
             </a:fld>
             <a:endParaRPr lang="en-SG"/>
           </a:p>
@@ -2705,7 +2705,7 @@
           <a:p>
             <a:fld id="{C4C33896-74DC-4DC9-8FFE-C8D9D6A25E64}" type="datetimeFigureOut">
               <a:rPr lang="en-SG" smtClean="0"/>
-              <a:t>25/5/2025</a:t>
+              <a:t>29/5/2025</a:t>
             </a:fld>
             <a:endParaRPr lang="en-SG"/>
           </a:p>
@@ -2948,7 +2948,7 @@
           <a:p>
             <a:fld id="{C4C33896-74DC-4DC9-8FFE-C8D9D6A25E64}" type="datetimeFigureOut">
               <a:rPr lang="en-SG" smtClean="0"/>
-              <a:t>25/5/2025</a:t>
+              <a:t>29/5/2025</a:t>
             </a:fld>
             <a:endParaRPr lang="en-SG"/>
           </a:p>
@@ -18592,10 +18592,10 @@
       </p:grpSpPr>
       <p:grpSp>
         <p:nvGrpSpPr>
-          <p:cNvPr id="3" name="Group 2">
+          <p:cNvPr id="8" name="Group 7">
             <a:extLst>
               <a:ext uri="{FF2B5EF4-FFF2-40B4-BE49-F238E27FC236}">
-                <a16:creationId xmlns:a16="http://schemas.microsoft.com/office/drawing/2014/main" id="{055F7EC7-2FE4-B46B-A0FB-90A4B520FB74}"/>
+                <a16:creationId xmlns:a16="http://schemas.microsoft.com/office/drawing/2014/main" id="{83D1F6DB-1542-8EC4-1533-ECF787A9B6CA}"/>
               </a:ext>
             </a:extLst>
           </p:cNvPr>
@@ -18605,41 +18605,11 @@
         <p:grpSpPr>
           <a:xfrm>
             <a:off x="894735" y="550608"/>
-            <a:ext cx="10849108" cy="4621160"/>
+            <a:ext cx="10436290" cy="4542502"/>
             <a:chOff x="894735" y="550608"/>
-            <a:chExt cx="10849108" cy="4621160"/>
+            <a:chExt cx="10436290" cy="4542502"/>
           </a:xfrm>
         </p:grpSpPr>
-        <p:pic>
-          <p:nvPicPr>
-            <p:cNvPr id="4" name="Picture 3">
-              <a:extLst>
-                <a:ext uri="{FF2B5EF4-FFF2-40B4-BE49-F238E27FC236}">
-                  <a16:creationId xmlns:a16="http://schemas.microsoft.com/office/drawing/2014/main" id="{17D9B4F5-ADEC-AFD2-C0FA-36AC85BC47F3}"/>
-                </a:ext>
-              </a:extLst>
-            </p:cNvPr>
-            <p:cNvPicPr>
-              <a:picLocks noChangeAspect="1"/>
-            </p:cNvPicPr>
-            <p:nvPr/>
-          </p:nvPicPr>
-          <p:blipFill>
-            <a:blip r:embed="rId2"/>
-            <a:stretch>
-              <a:fillRect/>
-            </a:stretch>
-          </p:blipFill>
-          <p:spPr>
-            <a:xfrm>
-              <a:off x="5317019" y="550608"/>
-              <a:ext cx="6426824" cy="4621160"/>
-            </a:xfrm>
-            <a:prstGeom prst="rect">
-              <a:avLst/>
-            </a:prstGeom>
-          </p:spPr>
-        </p:pic>
         <p:pic>
           <p:nvPicPr>
             <p:cNvPr id="6" name="Picture 5">
@@ -18655,7 +18625,7 @@
             <p:nvPr/>
           </p:nvPicPr>
           <p:blipFill>
-            <a:blip r:embed="rId3"/>
+            <a:blip r:embed="rId2"/>
             <a:stretch>
               <a:fillRect/>
             </a:stretch>
@@ -18731,6 +18701,36 @@
             </a:p>
           </p:txBody>
         </p:sp>
+        <p:pic>
+          <p:nvPicPr>
+            <p:cNvPr id="7" name="Picture 6">
+              <a:extLst>
+                <a:ext uri="{FF2B5EF4-FFF2-40B4-BE49-F238E27FC236}">
+                  <a16:creationId xmlns:a16="http://schemas.microsoft.com/office/drawing/2014/main" id="{430F7832-78A2-F75E-E31B-EB9D4F832B56}"/>
+                </a:ext>
+              </a:extLst>
+            </p:cNvPr>
+            <p:cNvPicPr>
+              <a:picLocks noChangeAspect="1"/>
+            </p:cNvPicPr>
+            <p:nvPr/>
+          </p:nvPicPr>
+          <p:blipFill>
+            <a:blip r:embed="rId3"/>
+            <a:stretch>
+              <a:fillRect/>
+            </a:stretch>
+          </p:blipFill>
+          <p:spPr>
+            <a:xfrm>
+              <a:off x="5011310" y="550608"/>
+              <a:ext cx="6319715" cy="4542502"/>
+            </a:xfrm>
+            <a:prstGeom prst="rect">
+              <a:avLst/>
+            </a:prstGeom>
+          </p:spPr>
+        </p:pic>
       </p:grpSp>
     </p:spTree>
     <p:extLst>

</xml_diff>